<commit_message>
updated power point fonts
</commit_message>
<xml_diff>
--- a/presentation/Auction Block.pptx
+++ b/presentation/Auction Block.pptx
@@ -2559,7 +2559,7 @@
           </a:pPr>
           <a:r>
             <a:rPr lang="en-US" sz="1600" cap="none" baseline="0" dirty="0">
-              <a:latin typeface="Times New Roman" panose="02020603050405020304" pitchFamily="18" charset="0"/>
+              <a:latin typeface="Arial Nova" panose="020B0504020202020204" pitchFamily="34" charset="0"/>
               <a:cs typeface="Times New Roman" panose="02020603050405020304" pitchFamily="18" charset="0"/>
             </a:rPr>
             <a:t>Users create and bid on auctions through a Facebook chat bot interface</a:t>
@@ -2604,21 +2604,21 @@
           </a:pPr>
           <a:r>
             <a:rPr lang="en-US" sz="1600" cap="none" baseline="0" dirty="0">
-              <a:latin typeface="Times New Roman" panose="02020603050405020304" pitchFamily="18" charset="0"/>
+              <a:latin typeface="Arial Nova" panose="020B0504020202020204" pitchFamily="34" charset="0"/>
               <a:cs typeface="Times New Roman" panose="02020603050405020304" pitchFamily="18" charset="0"/>
             </a:rPr>
             <a:t>All auctions are Ethereum smart contracts which interact with the chatbot through a </a:t>
           </a:r>
           <a:r>
             <a:rPr lang="en-US" sz="1600" cap="none" baseline="0" dirty="0" err="1">
-              <a:latin typeface="Times New Roman" panose="02020603050405020304" pitchFamily="18" charset="0"/>
+              <a:latin typeface="Arial Nova" panose="020B0504020202020204" pitchFamily="34" charset="0"/>
               <a:cs typeface="Times New Roman" panose="02020603050405020304" pitchFamily="18" charset="0"/>
             </a:rPr>
             <a:t>Javascript</a:t>
           </a:r>
           <a:r>
             <a:rPr lang="en-US" sz="1600" cap="none" baseline="0" dirty="0">
-              <a:latin typeface="Times New Roman" panose="02020603050405020304" pitchFamily="18" charset="0"/>
+              <a:latin typeface="Arial Nova" panose="020B0504020202020204" pitchFamily="34" charset="0"/>
               <a:cs typeface="Times New Roman" panose="02020603050405020304" pitchFamily="18" charset="0"/>
             </a:rPr>
             <a:t> backend</a:t>
@@ -2663,7 +2663,7 @@
           </a:pPr>
           <a:r>
             <a:rPr lang="en-US" sz="1600" cap="none" baseline="0" dirty="0">
-              <a:latin typeface="Times New Roman" panose="02020603050405020304" pitchFamily="18" charset="0"/>
+              <a:latin typeface="Arial Nova" panose="020B0504020202020204" pitchFamily="34" charset="0"/>
               <a:cs typeface="Times New Roman" panose="02020603050405020304" pitchFamily="18" charset="0"/>
             </a:rPr>
             <a:t>Auction winners receive an NFT that contains the auctioned NFT or auctioned item proof of ownership</a:t>
@@ -2916,7 +2916,9 @@
         <a:lstStyle/>
         <a:p>
           <a:r>
-            <a:rPr lang="en-US" dirty="0"/>
+            <a:rPr lang="en-US" dirty="0">
+              <a:latin typeface="Arial Nova" panose="020B0504020202020204" pitchFamily="34" charset="0"/>
+            </a:rPr>
             <a:t>Auction Contract Creation</a:t>
           </a:r>
         </a:p>
@@ -2929,7 +2931,9 @@
         <a:bodyPr/>
         <a:lstStyle/>
         <a:p>
-          <a:endParaRPr lang="en-US"/>
+          <a:endParaRPr lang="en-US">
+            <a:latin typeface="Arial Nova" panose="020B0504020202020204" pitchFamily="34" charset="0"/>
+          </a:endParaRPr>
         </a:p>
       </dgm:t>
     </dgm:pt>
@@ -2940,7 +2944,9 @@
         <a:bodyPr/>
         <a:lstStyle/>
         <a:p>
-          <a:endParaRPr lang="en-US"/>
+          <a:endParaRPr lang="en-US">
+            <a:latin typeface="Arial Nova" panose="020B0504020202020204" pitchFamily="34" charset="0"/>
+          </a:endParaRPr>
         </a:p>
       </dgm:t>
     </dgm:pt>
@@ -2952,10 +2958,14 @@
         <a:lstStyle/>
         <a:p>
           <a:r>
-            <a:rPr lang="en-US" sz="1800"/>
+            <a:rPr lang="en-US" sz="1800">
+              <a:latin typeface="Arial Nova" panose="020B0504020202020204" pitchFamily="34" charset="0"/>
+            </a:rPr>
             <a:t>Mint an NFT to be auctioned off.</a:t>
           </a:r>
-          <a:endParaRPr lang="en-US" sz="1800" dirty="0"/>
+          <a:endParaRPr lang="en-US" sz="1800" dirty="0">
+            <a:latin typeface="Arial Nova" panose="020B0504020202020204" pitchFamily="34" charset="0"/>
+          </a:endParaRPr>
         </a:p>
       </dgm:t>
     </dgm:pt>
@@ -2966,7 +2976,9 @@
         <a:bodyPr/>
         <a:lstStyle/>
         <a:p>
-          <a:endParaRPr lang="en-US"/>
+          <a:endParaRPr lang="en-US">
+            <a:latin typeface="Arial Nova" panose="020B0504020202020204" pitchFamily="34" charset="0"/>
+          </a:endParaRPr>
         </a:p>
       </dgm:t>
     </dgm:pt>
@@ -2977,7 +2989,9 @@
         <a:bodyPr/>
         <a:lstStyle/>
         <a:p>
-          <a:endParaRPr lang="en-US"/>
+          <a:endParaRPr lang="en-US">
+            <a:latin typeface="Arial Nova" panose="020B0504020202020204" pitchFamily="34" charset="0"/>
+          </a:endParaRPr>
         </a:p>
       </dgm:t>
     </dgm:pt>
@@ -2989,10 +3003,14 @@
         <a:lstStyle/>
         <a:p>
           <a:r>
-            <a:rPr lang="en-US" sz="1800"/>
+            <a:rPr lang="en-US" sz="1800">
+              <a:latin typeface="Arial Nova" panose="020B0504020202020204" pitchFamily="34" charset="0"/>
+            </a:rPr>
             <a:t>Set the auction start time</a:t>
           </a:r>
-          <a:endParaRPr lang="en-US" sz="1800" dirty="0"/>
+          <a:endParaRPr lang="en-US" sz="1800" dirty="0">
+            <a:latin typeface="Arial Nova" panose="020B0504020202020204" pitchFamily="34" charset="0"/>
+          </a:endParaRPr>
         </a:p>
       </dgm:t>
     </dgm:pt>
@@ -3003,7 +3021,9 @@
         <a:bodyPr/>
         <a:lstStyle/>
         <a:p>
-          <a:endParaRPr lang="en-US"/>
+          <a:endParaRPr lang="en-US">
+            <a:latin typeface="Arial Nova" panose="020B0504020202020204" pitchFamily="34" charset="0"/>
+          </a:endParaRPr>
         </a:p>
       </dgm:t>
     </dgm:pt>
@@ -3014,7 +3034,9 @@
         <a:bodyPr/>
         <a:lstStyle/>
         <a:p>
-          <a:endParaRPr lang="en-US"/>
+          <a:endParaRPr lang="en-US">
+            <a:latin typeface="Arial Nova" panose="020B0504020202020204" pitchFamily="34" charset="0"/>
+          </a:endParaRPr>
         </a:p>
       </dgm:t>
     </dgm:pt>
@@ -3026,7 +3048,9 @@
         <a:lstStyle/>
         <a:p>
           <a:r>
-            <a:rPr lang="en-US" dirty="0"/>
+            <a:rPr lang="en-US" dirty="0">
+              <a:latin typeface="Arial Nova" panose="020B0504020202020204" pitchFamily="34" charset="0"/>
+            </a:rPr>
             <a:t>Participate in the Auction</a:t>
           </a:r>
         </a:p>
@@ -3039,7 +3063,9 @@
         <a:bodyPr/>
         <a:lstStyle/>
         <a:p>
-          <a:endParaRPr lang="en-US"/>
+          <a:endParaRPr lang="en-US">
+            <a:latin typeface="Arial Nova" panose="020B0504020202020204" pitchFamily="34" charset="0"/>
+          </a:endParaRPr>
         </a:p>
       </dgm:t>
     </dgm:pt>
@@ -3050,7 +3076,9 @@
         <a:bodyPr/>
         <a:lstStyle/>
         <a:p>
-          <a:endParaRPr lang="en-US"/>
+          <a:endParaRPr lang="en-US">
+            <a:latin typeface="Arial Nova" panose="020B0504020202020204" pitchFamily="34" charset="0"/>
+          </a:endParaRPr>
         </a:p>
       </dgm:t>
     </dgm:pt>
@@ -3062,7 +3090,9 @@
         <a:lstStyle/>
         <a:p>
           <a:r>
-            <a:rPr lang="en-US" dirty="0"/>
+            <a:rPr lang="en-US" dirty="0">
+              <a:latin typeface="Arial Nova" panose="020B0504020202020204" pitchFamily="34" charset="0"/>
+            </a:rPr>
             <a:t>Through the chat bot, auction bidders will be able to see the current highest bid.</a:t>
           </a:r>
         </a:p>
@@ -3075,7 +3105,9 @@
         <a:bodyPr/>
         <a:lstStyle/>
         <a:p>
-          <a:endParaRPr lang="en-US"/>
+          <a:endParaRPr lang="en-US">
+            <a:latin typeface="Arial Nova" panose="020B0504020202020204" pitchFamily="34" charset="0"/>
+          </a:endParaRPr>
         </a:p>
       </dgm:t>
     </dgm:pt>
@@ -3086,7 +3118,9 @@
         <a:bodyPr/>
         <a:lstStyle/>
         <a:p>
-          <a:endParaRPr lang="en-US"/>
+          <a:endParaRPr lang="en-US">
+            <a:latin typeface="Arial Nova" panose="020B0504020202020204" pitchFamily="34" charset="0"/>
+          </a:endParaRPr>
         </a:p>
       </dgm:t>
     </dgm:pt>
@@ -3098,7 +3132,9 @@
         <a:lstStyle/>
         <a:p>
           <a:r>
-            <a:rPr lang="en-US" dirty="0"/>
+            <a:rPr lang="en-US" dirty="0">
+              <a:latin typeface="Arial Nova" panose="020B0504020202020204" pitchFamily="34" charset="0"/>
+            </a:rPr>
             <a:t>Winning an Auction</a:t>
           </a:r>
         </a:p>
@@ -3111,7 +3147,9 @@
         <a:bodyPr/>
         <a:lstStyle/>
         <a:p>
-          <a:endParaRPr lang="en-US"/>
+          <a:endParaRPr lang="en-US">
+            <a:latin typeface="Arial Nova" panose="020B0504020202020204" pitchFamily="34" charset="0"/>
+          </a:endParaRPr>
         </a:p>
       </dgm:t>
     </dgm:pt>
@@ -3122,7 +3160,9 @@
         <a:bodyPr/>
         <a:lstStyle/>
         <a:p>
-          <a:endParaRPr lang="en-US"/>
+          <a:endParaRPr lang="en-US">
+            <a:latin typeface="Arial Nova" panose="020B0504020202020204" pitchFamily="34" charset="0"/>
+          </a:endParaRPr>
         </a:p>
       </dgm:t>
     </dgm:pt>
@@ -3134,7 +3174,9 @@
         <a:lstStyle/>
         <a:p>
           <a:r>
-            <a:rPr lang="en-US" dirty="0"/>
+            <a:rPr lang="en-US" dirty="0">
+              <a:latin typeface="Arial Nova" panose="020B0504020202020204" pitchFamily="34" charset="0"/>
+            </a:rPr>
             <a:t>The winning bidder will receive the auctioned NFT along with the auction contract’s information.</a:t>
           </a:r>
         </a:p>
@@ -3147,7 +3189,9 @@
         <a:bodyPr/>
         <a:lstStyle/>
         <a:p>
-          <a:endParaRPr lang="en-US"/>
+          <a:endParaRPr lang="en-US">
+            <a:latin typeface="Arial Nova" panose="020B0504020202020204" pitchFamily="34" charset="0"/>
+          </a:endParaRPr>
         </a:p>
       </dgm:t>
     </dgm:pt>
@@ -3158,7 +3202,9 @@
         <a:bodyPr/>
         <a:lstStyle/>
         <a:p>
-          <a:endParaRPr lang="en-US"/>
+          <a:endParaRPr lang="en-US">
+            <a:latin typeface="Arial Nova" panose="020B0504020202020204" pitchFamily="34" charset="0"/>
+          </a:endParaRPr>
         </a:p>
       </dgm:t>
     </dgm:pt>
@@ -3174,10 +3220,14 @@
             <a:buChar char="Ø"/>
           </a:pPr>
           <a:r>
-            <a:rPr lang="en-US" sz="1400" b="0"/>
+            <a:rPr lang="en-US" sz="1400" b="0">
+              <a:latin typeface="Arial Nova" panose="020B0504020202020204" pitchFamily="34" charset="0"/>
+            </a:rPr>
             <a:t>Can contain an NFT itself, or some other proof of ownership for a physical item.</a:t>
           </a:r>
-          <a:endParaRPr lang="en-US" sz="1400" b="0" dirty="0"/>
+          <a:endParaRPr lang="en-US" sz="1400" b="0" dirty="0">
+            <a:latin typeface="Arial Nova" panose="020B0504020202020204" pitchFamily="34" charset="0"/>
+          </a:endParaRPr>
         </a:p>
       </dgm:t>
     </dgm:pt>
@@ -3188,7 +3238,9 @@
         <a:bodyPr/>
         <a:lstStyle/>
         <a:p>
-          <a:endParaRPr lang="en-US"/>
+          <a:endParaRPr lang="en-US">
+            <a:latin typeface="Arial Nova" panose="020B0504020202020204" pitchFamily="34" charset="0"/>
+          </a:endParaRPr>
         </a:p>
       </dgm:t>
     </dgm:pt>
@@ -3199,7 +3251,9 @@
         <a:bodyPr/>
         <a:lstStyle/>
         <a:p>
-          <a:endParaRPr lang="en-US"/>
+          <a:endParaRPr lang="en-US">
+            <a:latin typeface="Arial Nova" panose="020B0504020202020204" pitchFamily="34" charset="0"/>
+          </a:endParaRPr>
         </a:p>
       </dgm:t>
     </dgm:pt>
@@ -3211,10 +3265,14 @@
         <a:lstStyle/>
         <a:p>
           <a:r>
-            <a:rPr lang="en-US" sz="1800"/>
+            <a:rPr lang="en-US" sz="1800">
+              <a:latin typeface="Arial Nova" panose="020B0504020202020204" pitchFamily="34" charset="0"/>
+            </a:rPr>
             <a:t>Set the auction duration (default is 6 hours).</a:t>
           </a:r>
-          <a:endParaRPr lang="en-US" sz="1800" dirty="0"/>
+          <a:endParaRPr lang="en-US" sz="1800" dirty="0">
+            <a:latin typeface="Arial Nova" panose="020B0504020202020204" pitchFamily="34" charset="0"/>
+          </a:endParaRPr>
         </a:p>
       </dgm:t>
     </dgm:pt>
@@ -3225,7 +3283,9 @@
         <a:bodyPr/>
         <a:lstStyle/>
         <a:p>
-          <a:endParaRPr lang="en-US"/>
+          <a:endParaRPr lang="en-US">
+            <a:latin typeface="Arial Nova" panose="020B0504020202020204" pitchFamily="34" charset="0"/>
+          </a:endParaRPr>
         </a:p>
       </dgm:t>
     </dgm:pt>
@@ -3236,7 +3296,9 @@
         <a:bodyPr/>
         <a:lstStyle/>
         <a:p>
-          <a:endParaRPr lang="en-US"/>
+          <a:endParaRPr lang="en-US">
+            <a:latin typeface="Arial Nova" panose="020B0504020202020204" pitchFamily="34" charset="0"/>
+          </a:endParaRPr>
         </a:p>
       </dgm:t>
     </dgm:pt>
@@ -3248,10 +3310,14 @@
         <a:lstStyle/>
         <a:p>
           <a:r>
-            <a:rPr lang="en-US" sz="1800"/>
+            <a:rPr lang="en-US" sz="1800">
+              <a:latin typeface="Arial Nova" panose="020B0504020202020204" pitchFamily="34" charset="0"/>
+            </a:rPr>
             <a:t>Set the auction starting bid.</a:t>
           </a:r>
-          <a:endParaRPr lang="en-US" sz="1800" dirty="0"/>
+          <a:endParaRPr lang="en-US" sz="1800" dirty="0">
+            <a:latin typeface="Arial Nova" panose="020B0504020202020204" pitchFamily="34" charset="0"/>
+          </a:endParaRPr>
         </a:p>
       </dgm:t>
     </dgm:pt>
@@ -3262,7 +3328,9 @@
         <a:bodyPr/>
         <a:lstStyle/>
         <a:p>
-          <a:endParaRPr lang="en-US"/>
+          <a:endParaRPr lang="en-US">
+            <a:latin typeface="Arial Nova" panose="020B0504020202020204" pitchFamily="34" charset="0"/>
+          </a:endParaRPr>
         </a:p>
       </dgm:t>
     </dgm:pt>
@@ -3273,7 +3341,9 @@
         <a:bodyPr/>
         <a:lstStyle/>
         <a:p>
-          <a:endParaRPr lang="en-US"/>
+          <a:endParaRPr lang="en-US">
+            <a:latin typeface="Arial Nova" panose="020B0504020202020204" pitchFamily="34" charset="0"/>
+          </a:endParaRPr>
         </a:p>
       </dgm:t>
     </dgm:pt>
@@ -3288,7 +3358,9 @@
             <a:buFont typeface="Wingdings" panose="05000000000000000000" pitchFamily="2" charset="2"/>
             <a:buChar char="Ø"/>
           </a:pPr>
-          <a:endParaRPr lang="en-US" sz="1400" b="1" dirty="0"/>
+          <a:endParaRPr lang="en-US" sz="1400" b="1" dirty="0">
+            <a:latin typeface="Arial Nova" panose="020B0504020202020204" pitchFamily="34" charset="0"/>
+          </a:endParaRPr>
         </a:p>
       </dgm:t>
     </dgm:pt>
@@ -3299,7 +3371,9 @@
         <a:bodyPr/>
         <a:lstStyle/>
         <a:p>
-          <a:endParaRPr lang="en-US"/>
+          <a:endParaRPr lang="en-US">
+            <a:latin typeface="Arial Nova" panose="020B0504020202020204" pitchFamily="34" charset="0"/>
+          </a:endParaRPr>
         </a:p>
       </dgm:t>
     </dgm:pt>
@@ -3310,7 +3384,9 @@
         <a:bodyPr/>
         <a:lstStyle/>
         <a:p>
-          <a:endParaRPr lang="en-US"/>
+          <a:endParaRPr lang="en-US">
+            <a:latin typeface="Arial Nova" panose="020B0504020202020204" pitchFamily="34" charset="0"/>
+          </a:endParaRPr>
         </a:p>
       </dgm:t>
     </dgm:pt>
@@ -3321,7 +3397,9 @@
         <a:bodyPr/>
         <a:lstStyle/>
         <a:p>
-          <a:endParaRPr lang="en-US" sz="1800" dirty="0"/>
+          <a:endParaRPr lang="en-US" sz="1800" dirty="0">
+            <a:latin typeface="Arial Nova" panose="020B0504020202020204" pitchFamily="34" charset="0"/>
+          </a:endParaRPr>
         </a:p>
       </dgm:t>
     </dgm:pt>
@@ -3332,7 +3410,9 @@
         <a:bodyPr/>
         <a:lstStyle/>
         <a:p>
-          <a:endParaRPr lang="en-US"/>
+          <a:endParaRPr lang="en-US">
+            <a:latin typeface="Arial Nova" panose="020B0504020202020204" pitchFamily="34" charset="0"/>
+          </a:endParaRPr>
         </a:p>
       </dgm:t>
     </dgm:pt>
@@ -3343,7 +3423,9 @@
         <a:bodyPr/>
         <a:lstStyle/>
         <a:p>
-          <a:endParaRPr lang="en-US"/>
+          <a:endParaRPr lang="en-US">
+            <a:latin typeface="Arial Nova" panose="020B0504020202020204" pitchFamily="34" charset="0"/>
+          </a:endParaRPr>
         </a:p>
       </dgm:t>
     </dgm:pt>
@@ -3354,7 +3436,9 @@
         <a:bodyPr/>
         <a:lstStyle/>
         <a:p>
-          <a:endParaRPr lang="en-US" sz="1800" dirty="0"/>
+          <a:endParaRPr lang="en-US" sz="1800" dirty="0">
+            <a:latin typeface="Arial Nova" panose="020B0504020202020204" pitchFamily="34" charset="0"/>
+          </a:endParaRPr>
         </a:p>
       </dgm:t>
     </dgm:pt>
@@ -3365,7 +3449,9 @@
         <a:bodyPr/>
         <a:lstStyle/>
         <a:p>
-          <a:endParaRPr lang="en-US"/>
+          <a:endParaRPr lang="en-US">
+            <a:latin typeface="Arial Nova" panose="020B0504020202020204" pitchFamily="34" charset="0"/>
+          </a:endParaRPr>
         </a:p>
       </dgm:t>
     </dgm:pt>
@@ -3376,7 +3462,9 @@
         <a:bodyPr/>
         <a:lstStyle/>
         <a:p>
-          <a:endParaRPr lang="en-US"/>
+          <a:endParaRPr lang="en-US">
+            <a:latin typeface="Arial Nova" panose="020B0504020202020204" pitchFamily="34" charset="0"/>
+          </a:endParaRPr>
         </a:p>
       </dgm:t>
     </dgm:pt>
@@ -3388,7 +3476,9 @@
         <a:lstStyle/>
         <a:p>
           <a:r>
-            <a:rPr lang="en-US" dirty="0"/>
+            <a:rPr lang="en-US" dirty="0">
+              <a:latin typeface="Arial Nova" panose="020B0504020202020204" pitchFamily="34" charset="0"/>
+            </a:rPr>
             <a:t>If they wish to place a bid, their bid must be higher than the current highest bid.</a:t>
           </a:r>
         </a:p>
@@ -3401,7 +3491,9 @@
         <a:bodyPr/>
         <a:lstStyle/>
         <a:p>
-          <a:endParaRPr lang="en-US"/>
+          <a:endParaRPr lang="en-US">
+            <a:latin typeface="Arial Nova" panose="020B0504020202020204" pitchFamily="34" charset="0"/>
+          </a:endParaRPr>
         </a:p>
       </dgm:t>
     </dgm:pt>
@@ -3412,7 +3504,9 @@
         <a:bodyPr/>
         <a:lstStyle/>
         <a:p>
-          <a:endParaRPr lang="en-US"/>
+          <a:endParaRPr lang="en-US">
+            <a:latin typeface="Arial Nova" panose="020B0504020202020204" pitchFamily="34" charset="0"/>
+          </a:endParaRPr>
         </a:p>
       </dgm:t>
     </dgm:pt>
@@ -3423,7 +3517,9 @@
         <a:bodyPr/>
         <a:lstStyle/>
         <a:p>
-          <a:endParaRPr lang="en-US" dirty="0"/>
+          <a:endParaRPr lang="en-US" dirty="0">
+            <a:latin typeface="Arial Nova" panose="020B0504020202020204" pitchFamily="34" charset="0"/>
+          </a:endParaRPr>
         </a:p>
       </dgm:t>
     </dgm:pt>
@@ -3434,7 +3530,9 @@
         <a:bodyPr/>
         <a:lstStyle/>
         <a:p>
-          <a:endParaRPr lang="en-US"/>
+          <a:endParaRPr lang="en-US">
+            <a:latin typeface="Arial Nova" panose="020B0504020202020204" pitchFamily="34" charset="0"/>
+          </a:endParaRPr>
         </a:p>
       </dgm:t>
     </dgm:pt>
@@ -3445,7 +3543,9 @@
         <a:bodyPr/>
         <a:lstStyle/>
         <a:p>
-          <a:endParaRPr lang="en-US"/>
+          <a:endParaRPr lang="en-US">
+            <a:latin typeface="Arial Nova" panose="020B0504020202020204" pitchFamily="34" charset="0"/>
+          </a:endParaRPr>
         </a:p>
       </dgm:t>
     </dgm:pt>
@@ -3457,7 +3557,9 @@
         <a:lstStyle/>
         <a:p>
           <a:r>
-            <a:rPr lang="en-US" dirty="0"/>
+            <a:rPr lang="en-US" dirty="0">
+              <a:latin typeface="Arial Nova" panose="020B0504020202020204" pitchFamily="34" charset="0"/>
+            </a:rPr>
             <a:t>The auction contract will keep track of the highest bid and the auction time so that there is one winner at the end of the auction.</a:t>
           </a:r>
         </a:p>
@@ -3470,7 +3572,9 @@
         <a:bodyPr/>
         <a:lstStyle/>
         <a:p>
-          <a:endParaRPr lang="en-US"/>
+          <a:endParaRPr lang="en-US">
+            <a:latin typeface="Arial Nova" panose="020B0504020202020204" pitchFamily="34" charset="0"/>
+          </a:endParaRPr>
         </a:p>
       </dgm:t>
     </dgm:pt>
@@ -3481,7 +3585,9 @@
         <a:bodyPr/>
         <a:lstStyle/>
         <a:p>
-          <a:endParaRPr lang="en-US"/>
+          <a:endParaRPr lang="en-US">
+            <a:latin typeface="Arial Nova" panose="020B0504020202020204" pitchFamily="34" charset="0"/>
+          </a:endParaRPr>
         </a:p>
       </dgm:t>
     </dgm:pt>
@@ -3492,7 +3598,9 @@
         <a:bodyPr/>
         <a:lstStyle/>
         <a:p>
-          <a:endParaRPr lang="en-US" dirty="0"/>
+          <a:endParaRPr lang="en-US" dirty="0">
+            <a:latin typeface="Arial Nova" panose="020B0504020202020204" pitchFamily="34" charset="0"/>
+          </a:endParaRPr>
         </a:p>
       </dgm:t>
     </dgm:pt>
@@ -3503,7 +3611,9 @@
         <a:bodyPr/>
         <a:lstStyle/>
         <a:p>
-          <a:endParaRPr lang="en-US"/>
+          <a:endParaRPr lang="en-US">
+            <a:latin typeface="Arial Nova" panose="020B0504020202020204" pitchFamily="34" charset="0"/>
+          </a:endParaRPr>
         </a:p>
       </dgm:t>
     </dgm:pt>
@@ -3514,7 +3624,9 @@
         <a:bodyPr/>
         <a:lstStyle/>
         <a:p>
-          <a:endParaRPr lang="en-US"/>
+          <a:endParaRPr lang="en-US">
+            <a:latin typeface="Arial Nova" panose="020B0504020202020204" pitchFamily="34" charset="0"/>
+          </a:endParaRPr>
         </a:p>
       </dgm:t>
     </dgm:pt>
@@ -3526,7 +3638,9 @@
         <a:lstStyle/>
         <a:p>
           <a:r>
-            <a:rPr lang="en-US" dirty="0"/>
+            <a:rPr lang="en-US" dirty="0">
+              <a:latin typeface="Arial Nova" panose="020B0504020202020204" pitchFamily="34" charset="0"/>
+            </a:rPr>
             <a:t> Anytime a bidder gets out-bid by another user, their funds are automatically returned to them.  This creates no need to return any funds to losers at the end of the auction.</a:t>
           </a:r>
         </a:p>
@@ -3539,7 +3653,9 @@
         <a:bodyPr/>
         <a:lstStyle/>
         <a:p>
-          <a:endParaRPr lang="en-US"/>
+          <a:endParaRPr lang="en-US">
+            <a:latin typeface="Arial Nova" panose="020B0504020202020204" pitchFamily="34" charset="0"/>
+          </a:endParaRPr>
         </a:p>
       </dgm:t>
     </dgm:pt>
@@ -3550,7 +3666,9 @@
         <a:bodyPr/>
         <a:lstStyle/>
         <a:p>
-          <a:endParaRPr lang="en-US"/>
+          <a:endParaRPr lang="en-US">
+            <a:latin typeface="Arial Nova" panose="020B0504020202020204" pitchFamily="34" charset="0"/>
+          </a:endParaRPr>
         </a:p>
       </dgm:t>
     </dgm:pt>
@@ -3561,7 +3679,9 @@
         <a:bodyPr/>
         <a:lstStyle/>
         <a:p>
-          <a:endParaRPr lang="en-US" dirty="0"/>
+          <a:endParaRPr lang="en-US" dirty="0">
+            <a:latin typeface="Arial Nova" panose="020B0504020202020204" pitchFamily="34" charset="0"/>
+          </a:endParaRPr>
         </a:p>
       </dgm:t>
     </dgm:pt>
@@ -3572,7 +3692,9 @@
         <a:bodyPr/>
         <a:lstStyle/>
         <a:p>
-          <a:endParaRPr lang="en-US"/>
+          <a:endParaRPr lang="en-US">
+            <a:latin typeface="Arial Nova" panose="020B0504020202020204" pitchFamily="34" charset="0"/>
+          </a:endParaRPr>
         </a:p>
       </dgm:t>
     </dgm:pt>
@@ -3583,7 +3705,9 @@
         <a:bodyPr/>
         <a:lstStyle/>
         <a:p>
-          <a:endParaRPr lang="en-US"/>
+          <a:endParaRPr lang="en-US">
+            <a:latin typeface="Arial Nova" panose="020B0504020202020204" pitchFamily="34" charset="0"/>
+          </a:endParaRPr>
         </a:p>
       </dgm:t>
     </dgm:pt>
@@ -3595,7 +3719,9 @@
         <a:lstStyle/>
         <a:p>
           <a:r>
-            <a:rPr lang="en-US" dirty="0"/>
+            <a:rPr lang="en-US" dirty="0">
+              <a:latin typeface="Arial Nova" panose="020B0504020202020204" pitchFamily="34" charset="0"/>
+            </a:rPr>
             <a:t>The auction creator will be paid the winning bid amount.</a:t>
           </a:r>
         </a:p>
@@ -3608,7 +3734,9 @@
         <a:bodyPr/>
         <a:lstStyle/>
         <a:p>
-          <a:endParaRPr lang="en-US"/>
+          <a:endParaRPr lang="en-US">
+            <a:latin typeface="Arial Nova" panose="020B0504020202020204" pitchFamily="34" charset="0"/>
+          </a:endParaRPr>
         </a:p>
       </dgm:t>
     </dgm:pt>
@@ -3619,7 +3747,9 @@
         <a:bodyPr/>
         <a:lstStyle/>
         <a:p>
-          <a:endParaRPr lang="en-US"/>
+          <a:endParaRPr lang="en-US">
+            <a:latin typeface="Arial Nova" panose="020B0504020202020204" pitchFamily="34" charset="0"/>
+          </a:endParaRPr>
         </a:p>
       </dgm:t>
     </dgm:pt>
@@ -3630,7 +3760,9 @@
         <a:bodyPr/>
         <a:lstStyle/>
         <a:p>
-          <a:endParaRPr lang="en-US" dirty="0"/>
+          <a:endParaRPr lang="en-US" dirty="0">
+            <a:latin typeface="Arial Nova" panose="020B0504020202020204" pitchFamily="34" charset="0"/>
+          </a:endParaRPr>
         </a:p>
       </dgm:t>
     </dgm:pt>
@@ -3641,7 +3773,9 @@
         <a:bodyPr/>
         <a:lstStyle/>
         <a:p>
-          <a:endParaRPr lang="en-US"/>
+          <a:endParaRPr lang="en-US">
+            <a:latin typeface="Arial Nova" panose="020B0504020202020204" pitchFamily="34" charset="0"/>
+          </a:endParaRPr>
         </a:p>
       </dgm:t>
     </dgm:pt>
@@ -3652,7 +3786,9 @@
         <a:bodyPr/>
         <a:lstStyle/>
         <a:p>
-          <a:endParaRPr lang="en-US"/>
+          <a:endParaRPr lang="en-US">
+            <a:latin typeface="Arial Nova" panose="020B0504020202020204" pitchFamily="34" charset="0"/>
+          </a:endParaRPr>
         </a:p>
       </dgm:t>
     </dgm:pt>
@@ -4026,7 +4162,7 @@
       </dsp:nvSpPr>
       <dsp:spPr>
         <a:xfrm>
-          <a:off x="616949" y="197805"/>
+          <a:off x="616949" y="175426"/>
           <a:ext cx="1818562" cy="1818562"/>
         </a:xfrm>
         <a:prstGeom prst="ellipse">
@@ -4065,7 +4201,7 @@
       </dsp:nvSpPr>
       <dsp:spPr>
         <a:xfrm>
-          <a:off x="1004512" y="585368"/>
+          <a:off x="1004512" y="562989"/>
           <a:ext cx="1043437" cy="1043437"/>
         </a:xfrm>
         <a:prstGeom prst="rect">
@@ -4115,8 +4251,8 @@
       </dsp:nvSpPr>
       <dsp:spPr>
         <a:xfrm>
-          <a:off x="35606" y="2582806"/>
-          <a:ext cx="2981250" cy="945000"/>
+          <a:off x="35606" y="2560426"/>
+          <a:ext cx="2981250" cy="989758"/>
         </a:xfrm>
         <a:prstGeom prst="rect">
           <a:avLst/>
@@ -4160,7 +4296,7 @@
           </a:pPr>
           <a:r>
             <a:rPr lang="en-US" sz="1600" kern="1200" cap="none" baseline="0" dirty="0">
-              <a:latin typeface="Times New Roman" panose="02020603050405020304" pitchFamily="18" charset="0"/>
+              <a:latin typeface="Arial Nova" panose="020B0504020202020204" pitchFamily="34" charset="0"/>
               <a:cs typeface="Times New Roman" panose="02020603050405020304" pitchFamily="18" charset="0"/>
             </a:rPr>
             <a:t>Users create and bid on auctions through a Facebook chat bot interface</a:t>
@@ -4168,8 +4304,8 @@
         </a:p>
       </dsp:txBody>
       <dsp:txXfrm>
-        <a:off x="35606" y="2582806"/>
-        <a:ext cx="2981250" cy="945000"/>
+        <a:off x="35606" y="2560426"/>
+        <a:ext cx="2981250" cy="989758"/>
       </dsp:txXfrm>
     </dsp:sp>
     <dsp:sp modelId="{BCD8CDD9-0C56-4401-ADB1-8B48DAB2C96F}">
@@ -4179,7 +4315,7 @@
       </dsp:nvSpPr>
       <dsp:spPr>
         <a:xfrm>
-          <a:off x="4119918" y="197805"/>
+          <a:off x="4119918" y="175426"/>
           <a:ext cx="1818562" cy="1818562"/>
         </a:xfrm>
         <a:prstGeom prst="ellipse">
@@ -4218,7 +4354,7 @@
       </dsp:nvSpPr>
       <dsp:spPr>
         <a:xfrm>
-          <a:off x="4507481" y="585368"/>
+          <a:off x="4507481" y="562989"/>
           <a:ext cx="1043437" cy="1043437"/>
         </a:xfrm>
         <a:prstGeom prst="rect">
@@ -4265,8 +4401,8 @@
       </dsp:nvSpPr>
       <dsp:spPr>
         <a:xfrm>
-          <a:off x="3538574" y="2582806"/>
-          <a:ext cx="2981250" cy="945000"/>
+          <a:off x="3538574" y="2560426"/>
+          <a:ext cx="2981250" cy="989758"/>
         </a:xfrm>
         <a:prstGeom prst="rect">
           <a:avLst/>
@@ -4310,21 +4446,21 @@
           </a:pPr>
           <a:r>
             <a:rPr lang="en-US" sz="1600" kern="1200" cap="none" baseline="0" dirty="0">
-              <a:latin typeface="Times New Roman" panose="02020603050405020304" pitchFamily="18" charset="0"/>
+              <a:latin typeface="Arial Nova" panose="020B0504020202020204" pitchFamily="34" charset="0"/>
               <a:cs typeface="Times New Roman" panose="02020603050405020304" pitchFamily="18" charset="0"/>
             </a:rPr>
             <a:t>All auctions are Ethereum smart contracts which interact with the chatbot through a </a:t>
           </a:r>
           <a:r>
             <a:rPr lang="en-US" sz="1600" kern="1200" cap="none" baseline="0" dirty="0" err="1">
-              <a:latin typeface="Times New Roman" panose="02020603050405020304" pitchFamily="18" charset="0"/>
+              <a:latin typeface="Arial Nova" panose="020B0504020202020204" pitchFamily="34" charset="0"/>
               <a:cs typeface="Times New Roman" panose="02020603050405020304" pitchFamily="18" charset="0"/>
             </a:rPr>
             <a:t>Javascript</a:t>
           </a:r>
           <a:r>
             <a:rPr lang="en-US" sz="1600" kern="1200" cap="none" baseline="0" dirty="0">
-              <a:latin typeface="Times New Roman" panose="02020603050405020304" pitchFamily="18" charset="0"/>
+              <a:latin typeface="Arial Nova" panose="020B0504020202020204" pitchFamily="34" charset="0"/>
               <a:cs typeface="Times New Roman" panose="02020603050405020304" pitchFamily="18" charset="0"/>
             </a:rPr>
             <a:t> backend</a:t>
@@ -4332,8 +4468,8 @@
         </a:p>
       </dsp:txBody>
       <dsp:txXfrm>
-        <a:off x="3538574" y="2582806"/>
-        <a:ext cx="2981250" cy="945000"/>
+        <a:off x="3538574" y="2560426"/>
+        <a:ext cx="2981250" cy="989758"/>
       </dsp:txXfrm>
     </dsp:sp>
     <dsp:sp modelId="{FF93E135-77D6-48A0-8871-9BC93D705D06}">
@@ -4343,7 +4479,7 @@
       </dsp:nvSpPr>
       <dsp:spPr>
         <a:xfrm>
-          <a:off x="7622887" y="197805"/>
+          <a:off x="7622887" y="175426"/>
           <a:ext cx="1818562" cy="1818562"/>
         </a:xfrm>
         <a:prstGeom prst="ellipse">
@@ -4382,7 +4518,7 @@
       </dsp:nvSpPr>
       <dsp:spPr>
         <a:xfrm>
-          <a:off x="8010450" y="585368"/>
+          <a:off x="8010450" y="562989"/>
           <a:ext cx="1043437" cy="1043437"/>
         </a:xfrm>
         <a:prstGeom prst="rect">
@@ -4432,8 +4568,8 @@
       </dsp:nvSpPr>
       <dsp:spPr>
         <a:xfrm>
-          <a:off x="7041543" y="2582806"/>
-          <a:ext cx="2981250" cy="945000"/>
+          <a:off x="7041543" y="2560426"/>
+          <a:ext cx="2981250" cy="989758"/>
         </a:xfrm>
         <a:prstGeom prst="rect">
           <a:avLst/>
@@ -4477,7 +4613,7 @@
           </a:pPr>
           <a:r>
             <a:rPr lang="en-US" sz="1600" kern="1200" cap="none" baseline="0" dirty="0">
-              <a:latin typeface="Times New Roman" panose="02020603050405020304" pitchFamily="18" charset="0"/>
+              <a:latin typeface="Arial Nova" panose="020B0504020202020204" pitchFamily="34" charset="0"/>
               <a:cs typeface="Times New Roman" panose="02020603050405020304" pitchFamily="18" charset="0"/>
             </a:rPr>
             <a:t>Auction winners receive an NFT that contains the auctioned NFT or auctioned item proof of ownership</a:t>
@@ -4485,8 +4621,8 @@
         </a:p>
       </dsp:txBody>
       <dsp:txXfrm>
-        <a:off x="7041543" y="2582806"/>
-        <a:ext cx="2981250" cy="945000"/>
+        <a:off x="7041543" y="2560426"/>
+        <a:ext cx="2981250" cy="989758"/>
       </dsp:txXfrm>
     </dsp:sp>
   </dsp:spTree>
@@ -4508,8 +4644,8 @@
       </dsp:nvSpPr>
       <dsp:spPr>
         <a:xfrm>
-          <a:off x="3143" y="66006"/>
-          <a:ext cx="3064668" cy="460800"/>
+          <a:off x="3143" y="60742"/>
+          <a:ext cx="3064668" cy="489600"/>
         </a:xfrm>
         <a:prstGeom prst="rect">
           <a:avLst/>
@@ -4550,12 +4686,12 @@
         </a:fontRef>
       </dsp:style>
       <dsp:txBody>
-        <a:bodyPr spcFirstLastPara="0" vert="horz" wrap="square" lIns="113792" tIns="65024" rIns="113792" bIns="65024" numCol="1" spcCol="1270" anchor="ctr" anchorCtr="0">
+        <a:bodyPr spcFirstLastPara="0" vert="horz" wrap="square" lIns="120904" tIns="69088" rIns="120904" bIns="69088" numCol="1" spcCol="1270" anchor="ctr" anchorCtr="0">
           <a:noAutofit/>
         </a:bodyPr>
         <a:lstStyle/>
         <a:p>
-          <a:pPr marL="0" lvl="0" indent="0" algn="ctr" defTabSz="711200">
+          <a:pPr marL="0" lvl="0" indent="0" algn="ctr" defTabSz="755650">
             <a:lnSpc>
               <a:spcPct val="90000"/>
             </a:lnSpc>
@@ -4568,14 +4704,16 @@
             <a:buNone/>
           </a:pPr>
           <a:r>
-            <a:rPr lang="en-US" sz="1600" kern="1200" dirty="0"/>
+            <a:rPr lang="en-US" sz="1700" kern="1200" dirty="0">
+              <a:latin typeface="Arial Nova" panose="020B0504020202020204" pitchFamily="34" charset="0"/>
+            </a:rPr>
             <a:t>Auction Contract Creation</a:t>
           </a:r>
         </a:p>
       </dsp:txBody>
       <dsp:txXfrm>
-        <a:off x="3143" y="66006"/>
-        <a:ext cx="3064668" cy="460800"/>
+        <a:off x="3143" y="60742"/>
+        <a:ext cx="3064668" cy="489600"/>
       </dsp:txXfrm>
     </dsp:sp>
     <dsp:sp modelId="{2634F61E-01CF-41A1-8C4E-DC45AC65FF86}">
@@ -4585,8 +4723,8 @@
       </dsp:nvSpPr>
       <dsp:spPr>
         <a:xfrm>
-          <a:off x="3143" y="526806"/>
-          <a:ext cx="3064668" cy="4257495"/>
+          <a:off x="3143" y="550342"/>
+          <a:ext cx="3064668" cy="4239223"/>
         </a:xfrm>
         <a:prstGeom prst="rect">
           <a:avLst/>
@@ -4647,10 +4785,14 @@
             <a:buChar char="•"/>
           </a:pPr>
           <a:r>
-            <a:rPr lang="en-US" sz="1800" kern="1200"/>
+            <a:rPr lang="en-US" sz="1800" kern="1200">
+              <a:latin typeface="Arial Nova" panose="020B0504020202020204" pitchFamily="34" charset="0"/>
+            </a:rPr>
             <a:t>Mint an NFT to be auctioned off.</a:t>
           </a:r>
-          <a:endParaRPr lang="en-US" sz="1800" kern="1200" dirty="0"/>
+          <a:endParaRPr lang="en-US" sz="1800" kern="1200" dirty="0">
+            <a:latin typeface="Arial Nova" panose="020B0504020202020204" pitchFamily="34" charset="0"/>
+          </a:endParaRPr>
         </a:p>
         <a:p>
           <a:pPr marL="228600" lvl="2" indent="-114300" algn="l" defTabSz="622300">
@@ -4667,10 +4809,14 @@
             <a:buChar char="Ø"/>
           </a:pPr>
           <a:r>
-            <a:rPr lang="en-US" sz="1400" b="0" kern="1200"/>
+            <a:rPr lang="en-US" sz="1400" b="0" kern="1200">
+              <a:latin typeface="Arial Nova" panose="020B0504020202020204" pitchFamily="34" charset="0"/>
+            </a:rPr>
             <a:t>Can contain an NFT itself, or some other proof of ownership for a physical item.</a:t>
           </a:r>
-          <a:endParaRPr lang="en-US" sz="1400" b="0" kern="1200" dirty="0"/>
+          <a:endParaRPr lang="en-US" sz="1400" b="0" kern="1200" dirty="0">
+            <a:latin typeface="Arial Nova" panose="020B0504020202020204" pitchFamily="34" charset="0"/>
+          </a:endParaRPr>
         </a:p>
         <a:p>
           <a:pPr marL="228600" lvl="2" indent="-114300" algn="l" defTabSz="622300">
@@ -4686,7 +4832,9 @@
             <a:buFont typeface="Wingdings" panose="05000000000000000000" pitchFamily="2" charset="2"/>
             <a:buChar char="Ø"/>
           </a:pPr>
-          <a:endParaRPr lang="en-US" sz="1400" b="1" kern="1200" dirty="0"/>
+          <a:endParaRPr lang="en-US" sz="1400" b="1" kern="1200" dirty="0">
+            <a:latin typeface="Arial Nova" panose="020B0504020202020204" pitchFamily="34" charset="0"/>
+          </a:endParaRPr>
         </a:p>
         <a:p>
           <a:pPr marL="171450" lvl="1" indent="-171450" algn="l" defTabSz="800100">
@@ -4702,10 +4850,14 @@
             <a:buChar char="•"/>
           </a:pPr>
           <a:r>
-            <a:rPr lang="en-US" sz="1800" kern="1200"/>
+            <a:rPr lang="en-US" sz="1800" kern="1200">
+              <a:latin typeface="Arial Nova" panose="020B0504020202020204" pitchFamily="34" charset="0"/>
+            </a:rPr>
             <a:t>Set the auction start time</a:t>
           </a:r>
-          <a:endParaRPr lang="en-US" sz="1800" kern="1200" dirty="0"/>
+          <a:endParaRPr lang="en-US" sz="1800" kern="1200" dirty="0">
+            <a:latin typeface="Arial Nova" panose="020B0504020202020204" pitchFamily="34" charset="0"/>
+          </a:endParaRPr>
         </a:p>
         <a:p>
           <a:pPr marL="171450" lvl="1" indent="-171450" algn="l" defTabSz="800100">
@@ -4720,7 +4872,9 @@
             </a:spcAft>
             <a:buChar char="•"/>
           </a:pPr>
-          <a:endParaRPr lang="en-US" sz="1800" kern="1200" dirty="0"/>
+          <a:endParaRPr lang="en-US" sz="1800" kern="1200" dirty="0">
+            <a:latin typeface="Arial Nova" panose="020B0504020202020204" pitchFamily="34" charset="0"/>
+          </a:endParaRPr>
         </a:p>
         <a:p>
           <a:pPr marL="171450" lvl="1" indent="-171450" algn="l" defTabSz="800100">
@@ -4736,10 +4890,14 @@
             <a:buChar char="•"/>
           </a:pPr>
           <a:r>
-            <a:rPr lang="en-US" sz="1800" kern="1200"/>
+            <a:rPr lang="en-US" sz="1800" kern="1200">
+              <a:latin typeface="Arial Nova" panose="020B0504020202020204" pitchFamily="34" charset="0"/>
+            </a:rPr>
             <a:t>Set the auction starting bid.</a:t>
           </a:r>
-          <a:endParaRPr lang="en-US" sz="1800" kern="1200" dirty="0"/>
+          <a:endParaRPr lang="en-US" sz="1800" kern="1200" dirty="0">
+            <a:latin typeface="Arial Nova" panose="020B0504020202020204" pitchFamily="34" charset="0"/>
+          </a:endParaRPr>
         </a:p>
         <a:p>
           <a:pPr marL="171450" lvl="1" indent="-171450" algn="l" defTabSz="800100">
@@ -4754,7 +4912,9 @@
             </a:spcAft>
             <a:buChar char="•"/>
           </a:pPr>
-          <a:endParaRPr lang="en-US" sz="1800" kern="1200" dirty="0"/>
+          <a:endParaRPr lang="en-US" sz="1800" kern="1200" dirty="0">
+            <a:latin typeface="Arial Nova" panose="020B0504020202020204" pitchFamily="34" charset="0"/>
+          </a:endParaRPr>
         </a:p>
         <a:p>
           <a:pPr marL="171450" lvl="1" indent="-171450" algn="l" defTabSz="800100">
@@ -4770,15 +4930,19 @@
             <a:buChar char="•"/>
           </a:pPr>
           <a:r>
-            <a:rPr lang="en-US" sz="1800" kern="1200"/>
+            <a:rPr lang="en-US" sz="1800" kern="1200">
+              <a:latin typeface="Arial Nova" panose="020B0504020202020204" pitchFamily="34" charset="0"/>
+            </a:rPr>
             <a:t>Set the auction duration (default is 6 hours).</a:t>
           </a:r>
-          <a:endParaRPr lang="en-US" sz="1800" kern="1200" dirty="0"/>
+          <a:endParaRPr lang="en-US" sz="1800" kern="1200" dirty="0">
+            <a:latin typeface="Arial Nova" panose="020B0504020202020204" pitchFamily="34" charset="0"/>
+          </a:endParaRPr>
         </a:p>
       </dsp:txBody>
       <dsp:txXfrm>
-        <a:off x="3143" y="526806"/>
-        <a:ext cx="3064668" cy="4257495"/>
+        <a:off x="3143" y="550342"/>
+        <a:ext cx="3064668" cy="4239223"/>
       </dsp:txXfrm>
     </dsp:sp>
     <dsp:sp modelId="{3AA91630-54E0-48CC-AD17-7E840671243E}">
@@ -4788,8 +4952,8 @@
       </dsp:nvSpPr>
       <dsp:spPr>
         <a:xfrm>
-          <a:off x="3496865" y="66006"/>
-          <a:ext cx="3064668" cy="460800"/>
+          <a:off x="3496865" y="60742"/>
+          <a:ext cx="3064668" cy="489600"/>
         </a:xfrm>
         <a:prstGeom prst="rect">
           <a:avLst/>
@@ -4830,12 +4994,12 @@
         </a:fontRef>
       </dsp:style>
       <dsp:txBody>
-        <a:bodyPr spcFirstLastPara="0" vert="horz" wrap="square" lIns="113792" tIns="65024" rIns="113792" bIns="65024" numCol="1" spcCol="1270" anchor="ctr" anchorCtr="0">
+        <a:bodyPr spcFirstLastPara="0" vert="horz" wrap="square" lIns="120904" tIns="69088" rIns="120904" bIns="69088" numCol="1" spcCol="1270" anchor="ctr" anchorCtr="0">
           <a:noAutofit/>
         </a:bodyPr>
         <a:lstStyle/>
         <a:p>
-          <a:pPr marL="0" lvl="0" indent="0" algn="ctr" defTabSz="711200">
+          <a:pPr marL="0" lvl="0" indent="0" algn="ctr" defTabSz="755650">
             <a:lnSpc>
               <a:spcPct val="90000"/>
             </a:lnSpc>
@@ -4848,14 +5012,16 @@
             <a:buNone/>
           </a:pPr>
           <a:r>
-            <a:rPr lang="en-US" sz="1600" kern="1200" dirty="0"/>
+            <a:rPr lang="en-US" sz="1700" kern="1200" dirty="0">
+              <a:latin typeface="Arial Nova" panose="020B0504020202020204" pitchFamily="34" charset="0"/>
+            </a:rPr>
             <a:t>Participate in the Auction</a:t>
           </a:r>
         </a:p>
       </dsp:txBody>
       <dsp:txXfrm>
-        <a:off x="3496865" y="66006"/>
-        <a:ext cx="3064668" cy="460800"/>
+        <a:off x="3496865" y="60742"/>
+        <a:ext cx="3064668" cy="489600"/>
       </dsp:txXfrm>
     </dsp:sp>
     <dsp:sp modelId="{8954480A-0DF6-46C0-9867-7F5C40BA861B}">
@@ -4865,8 +5031,8 @@
       </dsp:nvSpPr>
       <dsp:spPr>
         <a:xfrm>
-          <a:off x="3496865" y="526806"/>
-          <a:ext cx="3064668" cy="4257495"/>
+          <a:off x="3496865" y="550342"/>
+          <a:ext cx="3064668" cy="4239223"/>
         </a:xfrm>
         <a:prstGeom prst="rect">
           <a:avLst/>
@@ -4909,12 +5075,12 @@
         <a:fontRef idx="minor"/>
       </dsp:style>
       <dsp:txBody>
-        <a:bodyPr spcFirstLastPara="0" vert="horz" wrap="square" lIns="85344" tIns="85344" rIns="113792" bIns="128016" numCol="1" spcCol="1270" anchor="t" anchorCtr="0">
+        <a:bodyPr spcFirstLastPara="0" vert="horz" wrap="square" lIns="90678" tIns="90678" rIns="120904" bIns="136017" numCol="1" spcCol="1270" anchor="t" anchorCtr="0">
           <a:noAutofit/>
         </a:bodyPr>
         <a:lstStyle/>
         <a:p>
-          <a:pPr marL="171450" lvl="1" indent="-171450" algn="l" defTabSz="711200">
+          <a:pPr marL="171450" lvl="1" indent="-171450" algn="l" defTabSz="755650">
             <a:lnSpc>
               <a:spcPct val="90000"/>
             </a:lnSpc>
@@ -4927,12 +5093,14 @@
             <a:buChar char="•"/>
           </a:pPr>
           <a:r>
-            <a:rPr lang="en-US" sz="1600" kern="1200" dirty="0"/>
+            <a:rPr lang="en-US" sz="1700" kern="1200" dirty="0">
+              <a:latin typeface="Arial Nova" panose="020B0504020202020204" pitchFamily="34" charset="0"/>
+            </a:rPr>
             <a:t>Through the chat bot, auction bidders will be able to see the current highest bid.</a:t>
           </a:r>
         </a:p>
         <a:p>
-          <a:pPr marL="171450" lvl="1" indent="-171450" algn="l" defTabSz="711200">
+          <a:pPr marL="171450" lvl="1" indent="-171450" algn="l" defTabSz="755650">
             <a:lnSpc>
               <a:spcPct val="90000"/>
             </a:lnSpc>
@@ -4944,10 +5112,12 @@
             </a:spcAft>
             <a:buChar char="•"/>
           </a:pPr>
-          <a:endParaRPr lang="en-US" sz="1600" kern="1200" dirty="0"/>
+          <a:endParaRPr lang="en-US" sz="1700" kern="1200" dirty="0">
+            <a:latin typeface="Arial Nova" panose="020B0504020202020204" pitchFamily="34" charset="0"/>
+          </a:endParaRPr>
         </a:p>
         <a:p>
-          <a:pPr marL="171450" lvl="1" indent="-171450" algn="l" defTabSz="711200">
+          <a:pPr marL="171450" lvl="1" indent="-171450" algn="l" defTabSz="755650">
             <a:lnSpc>
               <a:spcPct val="90000"/>
             </a:lnSpc>
@@ -4960,12 +5130,14 @@
             <a:buChar char="•"/>
           </a:pPr>
           <a:r>
-            <a:rPr lang="en-US" sz="1600" kern="1200" dirty="0"/>
+            <a:rPr lang="en-US" sz="1700" kern="1200" dirty="0">
+              <a:latin typeface="Arial Nova" panose="020B0504020202020204" pitchFamily="34" charset="0"/>
+            </a:rPr>
             <a:t>If they wish to place a bid, their bid must be higher than the current highest bid.</a:t>
           </a:r>
         </a:p>
         <a:p>
-          <a:pPr marL="171450" lvl="1" indent="-171450" algn="l" defTabSz="711200">
+          <a:pPr marL="171450" lvl="1" indent="-171450" algn="l" defTabSz="755650">
             <a:lnSpc>
               <a:spcPct val="90000"/>
             </a:lnSpc>
@@ -4977,10 +5149,12 @@
             </a:spcAft>
             <a:buChar char="•"/>
           </a:pPr>
-          <a:endParaRPr lang="en-US" sz="1600" kern="1200" dirty="0"/>
+          <a:endParaRPr lang="en-US" sz="1700" kern="1200" dirty="0">
+            <a:latin typeface="Arial Nova" panose="020B0504020202020204" pitchFamily="34" charset="0"/>
+          </a:endParaRPr>
         </a:p>
         <a:p>
-          <a:pPr marL="171450" lvl="1" indent="-171450" algn="l" defTabSz="711200">
+          <a:pPr marL="171450" lvl="1" indent="-171450" algn="l" defTabSz="755650">
             <a:lnSpc>
               <a:spcPct val="90000"/>
             </a:lnSpc>
@@ -4993,14 +5167,16 @@
             <a:buChar char="•"/>
           </a:pPr>
           <a:r>
-            <a:rPr lang="en-US" sz="1600" kern="1200" dirty="0"/>
+            <a:rPr lang="en-US" sz="1700" kern="1200" dirty="0">
+              <a:latin typeface="Arial Nova" panose="020B0504020202020204" pitchFamily="34" charset="0"/>
+            </a:rPr>
             <a:t>The auction contract will keep track of the highest bid and the auction time so that there is one winner at the end of the auction.</a:t>
           </a:r>
         </a:p>
       </dsp:txBody>
       <dsp:txXfrm>
-        <a:off x="3496865" y="526806"/>
-        <a:ext cx="3064668" cy="4257495"/>
+        <a:off x="3496865" y="550342"/>
+        <a:ext cx="3064668" cy="4239223"/>
       </dsp:txXfrm>
     </dsp:sp>
     <dsp:sp modelId="{F932F6B4-2F29-41A5-B0A7-26D7AE38D369}">
@@ -5010,8 +5186,8 @@
       </dsp:nvSpPr>
       <dsp:spPr>
         <a:xfrm>
-          <a:off x="6990588" y="66006"/>
-          <a:ext cx="3064668" cy="460800"/>
+          <a:off x="6990588" y="60742"/>
+          <a:ext cx="3064668" cy="489600"/>
         </a:xfrm>
         <a:prstGeom prst="rect">
           <a:avLst/>
@@ -5052,12 +5228,12 @@
         </a:fontRef>
       </dsp:style>
       <dsp:txBody>
-        <a:bodyPr spcFirstLastPara="0" vert="horz" wrap="square" lIns="113792" tIns="65024" rIns="113792" bIns="65024" numCol="1" spcCol="1270" anchor="ctr" anchorCtr="0">
+        <a:bodyPr spcFirstLastPara="0" vert="horz" wrap="square" lIns="120904" tIns="69088" rIns="120904" bIns="69088" numCol="1" spcCol="1270" anchor="ctr" anchorCtr="0">
           <a:noAutofit/>
         </a:bodyPr>
         <a:lstStyle/>
         <a:p>
-          <a:pPr marL="0" lvl="0" indent="0" algn="ctr" defTabSz="711200">
+          <a:pPr marL="0" lvl="0" indent="0" algn="ctr" defTabSz="755650">
             <a:lnSpc>
               <a:spcPct val="90000"/>
             </a:lnSpc>
@@ -5070,14 +5246,16 @@
             <a:buNone/>
           </a:pPr>
           <a:r>
-            <a:rPr lang="en-US" sz="1600" kern="1200" dirty="0"/>
+            <a:rPr lang="en-US" sz="1700" kern="1200" dirty="0">
+              <a:latin typeface="Arial Nova" panose="020B0504020202020204" pitchFamily="34" charset="0"/>
+            </a:rPr>
             <a:t>Winning an Auction</a:t>
           </a:r>
         </a:p>
       </dsp:txBody>
       <dsp:txXfrm>
-        <a:off x="6990588" y="66006"/>
-        <a:ext cx="3064668" cy="460800"/>
+        <a:off x="6990588" y="60742"/>
+        <a:ext cx="3064668" cy="489600"/>
       </dsp:txXfrm>
     </dsp:sp>
     <dsp:sp modelId="{03101FAA-AF12-4540-B4C1-ABE84296490F}">
@@ -5087,8 +5265,8 @@
       </dsp:nvSpPr>
       <dsp:spPr>
         <a:xfrm>
-          <a:off x="6990588" y="526806"/>
-          <a:ext cx="3064668" cy="4257495"/>
+          <a:off x="6990588" y="550342"/>
+          <a:ext cx="3064668" cy="4239223"/>
         </a:xfrm>
         <a:prstGeom prst="rect">
           <a:avLst/>
@@ -5131,12 +5309,12 @@
         <a:fontRef idx="minor"/>
       </dsp:style>
       <dsp:txBody>
-        <a:bodyPr spcFirstLastPara="0" vert="horz" wrap="square" lIns="85344" tIns="85344" rIns="113792" bIns="128016" numCol="1" spcCol="1270" anchor="t" anchorCtr="0">
+        <a:bodyPr spcFirstLastPara="0" vert="horz" wrap="square" lIns="90678" tIns="90678" rIns="120904" bIns="136017" numCol="1" spcCol="1270" anchor="t" anchorCtr="0">
           <a:noAutofit/>
         </a:bodyPr>
         <a:lstStyle/>
         <a:p>
-          <a:pPr marL="171450" lvl="1" indent="-171450" algn="l" defTabSz="711200">
+          <a:pPr marL="171450" lvl="1" indent="-171450" algn="l" defTabSz="755650">
             <a:lnSpc>
               <a:spcPct val="90000"/>
             </a:lnSpc>
@@ -5149,12 +5327,14 @@
             <a:buChar char="•"/>
           </a:pPr>
           <a:r>
-            <a:rPr lang="en-US" sz="1600" kern="1200" dirty="0"/>
+            <a:rPr lang="en-US" sz="1700" kern="1200" dirty="0">
+              <a:latin typeface="Arial Nova" panose="020B0504020202020204" pitchFamily="34" charset="0"/>
+            </a:rPr>
             <a:t>The winning bidder will receive the auctioned NFT along with the auction contract’s information.</a:t>
           </a:r>
         </a:p>
         <a:p>
-          <a:pPr marL="171450" lvl="1" indent="-171450" algn="l" defTabSz="711200">
+          <a:pPr marL="171450" lvl="1" indent="-171450" algn="l" defTabSz="755650">
             <a:lnSpc>
               <a:spcPct val="90000"/>
             </a:lnSpc>
@@ -5166,10 +5346,12 @@
             </a:spcAft>
             <a:buChar char="•"/>
           </a:pPr>
-          <a:endParaRPr lang="en-US" sz="1600" kern="1200" dirty="0"/>
+          <a:endParaRPr lang="en-US" sz="1700" kern="1200" dirty="0">
+            <a:latin typeface="Arial Nova" panose="020B0504020202020204" pitchFamily="34" charset="0"/>
+          </a:endParaRPr>
         </a:p>
         <a:p>
-          <a:pPr marL="171450" lvl="1" indent="-171450" algn="l" defTabSz="711200">
+          <a:pPr marL="171450" lvl="1" indent="-171450" algn="l" defTabSz="755650">
             <a:lnSpc>
               <a:spcPct val="90000"/>
             </a:lnSpc>
@@ -5182,12 +5364,14 @@
             <a:buChar char="•"/>
           </a:pPr>
           <a:r>
-            <a:rPr lang="en-US" sz="1600" kern="1200" dirty="0"/>
+            <a:rPr lang="en-US" sz="1700" kern="1200" dirty="0">
+              <a:latin typeface="Arial Nova" panose="020B0504020202020204" pitchFamily="34" charset="0"/>
+            </a:rPr>
             <a:t> Anytime a bidder gets out-bid by another user, their funds are automatically returned to them.  This creates no need to return any funds to losers at the end of the auction.</a:t>
           </a:r>
         </a:p>
         <a:p>
-          <a:pPr marL="171450" lvl="1" indent="-171450" algn="l" defTabSz="711200">
+          <a:pPr marL="171450" lvl="1" indent="-171450" algn="l" defTabSz="755650">
             <a:lnSpc>
               <a:spcPct val="90000"/>
             </a:lnSpc>
@@ -5199,10 +5383,12 @@
             </a:spcAft>
             <a:buChar char="•"/>
           </a:pPr>
-          <a:endParaRPr lang="en-US" sz="1600" kern="1200" dirty="0"/>
+          <a:endParaRPr lang="en-US" sz="1700" kern="1200" dirty="0">
+            <a:latin typeface="Arial Nova" panose="020B0504020202020204" pitchFamily="34" charset="0"/>
+          </a:endParaRPr>
         </a:p>
         <a:p>
-          <a:pPr marL="171450" lvl="1" indent="-171450" algn="l" defTabSz="711200">
+          <a:pPr marL="171450" lvl="1" indent="-171450" algn="l" defTabSz="755650">
             <a:lnSpc>
               <a:spcPct val="90000"/>
             </a:lnSpc>
@@ -5215,14 +5401,16 @@
             <a:buChar char="•"/>
           </a:pPr>
           <a:r>
-            <a:rPr lang="en-US" sz="1600" kern="1200" dirty="0"/>
+            <a:rPr lang="en-US" sz="1700" kern="1200" dirty="0">
+              <a:latin typeface="Arial Nova" panose="020B0504020202020204" pitchFamily="34" charset="0"/>
+            </a:rPr>
             <a:t>The auction creator will be paid the winning bid amount.</a:t>
           </a:r>
         </a:p>
       </dsp:txBody>
       <dsp:txXfrm>
-        <a:off x="6990588" y="526806"/>
-        <a:ext cx="3064668" cy="4257495"/>
+        <a:off x="6990588" y="550342"/>
+        <a:ext cx="3064668" cy="4239223"/>
       </dsp:txXfrm>
     </dsp:sp>
   </dsp:spTree>
@@ -13615,7 +13803,7 @@
             <p:ph idx="1"/>
             <p:extLst>
               <p:ext uri="{D42A27DB-BD31-4B8C-83A1-F6EECF244321}">
-                <p14:modId xmlns:p14="http://schemas.microsoft.com/office/powerpoint/2010/main" val="1891390682"/>
+                <p14:modId xmlns:p14="http://schemas.microsoft.com/office/powerpoint/2010/main" val="2365145315"/>
               </p:ext>
             </p:extLst>
           </p:nvPr>
@@ -13709,7 +13897,7 @@
             <p:ph idx="1"/>
             <p:extLst>
               <p:ext uri="{D42A27DB-BD31-4B8C-83A1-F6EECF244321}">
-                <p14:modId xmlns:p14="http://schemas.microsoft.com/office/powerpoint/2010/main" val="3062470936"/>
+                <p14:modId xmlns:p14="http://schemas.microsoft.com/office/powerpoint/2010/main" val="519770907"/>
               </p:ext>
             </p:extLst>
           </p:nvPr>
@@ -14264,24 +14452,6 @@
 </file>
 
 <file path=customXml/item1.xml><?xml version="1.0" encoding="utf-8"?>
-<p:properties xmlns:p="http://schemas.microsoft.com/office/2006/metadata/properties" xmlns:xsi="http://www.w3.org/2001/XMLSchema-instance" xmlns:pc="http://schemas.microsoft.com/office/infopath/2007/PartnerControls">
-  <documentManagement>
-    <Status xmlns="71af3243-3dd4-4a8d-8c0d-dd76da1f02a5">Not started</Status>
-    <MediaServiceKeyPoints xmlns="71af3243-3dd4-4a8d-8c0d-dd76da1f02a5" xsi:nil="true"/>
-  </documentManagement>
-</p:properties>
-</file>
-
-<file path=customXml/item2.xml><?xml version="1.0" encoding="utf-8"?>
-<?mso-contentType ?>
-<FormTemplates xmlns="http://schemas.microsoft.com/sharepoint/v3/contenttype/forms">
-  <Display>DocumentLibraryForm</Display>
-  <Edit>DocumentLibraryForm</Edit>
-  <New>DocumentLibraryForm</New>
-</FormTemplates>
-</file>
-
-<file path=customXml/item3.xml><?xml version="1.0" encoding="utf-8"?>
 <ct:contentTypeSchema xmlns:ct="http://schemas.microsoft.com/office/2006/metadata/contentType" xmlns:ma="http://schemas.microsoft.com/office/2006/metadata/properties/metaAttributes" ct:_="" ma:_="" ma:contentTypeName="Document" ma:contentTypeID="0x01010079F111ED35F8CC479449609E8A0923A6" ma:contentTypeVersion="12" ma:contentTypeDescription="Create a new document." ma:contentTypeScope="" ma:versionID="a410dd7f93c95333ffa1b60ed6adedd1">
   <xsd:schema xmlns:xsd="http://www.w3.org/2001/XMLSchema" xmlns:xs="http://www.w3.org/2001/XMLSchema" xmlns:p="http://schemas.microsoft.com/office/2006/metadata/properties" xmlns:ns2="71af3243-3dd4-4a8d-8c0d-dd76da1f02a5" xmlns:ns3="16c05727-aa75-4e4a-9b5f-8a80a1165891" targetNamespace="http://schemas.microsoft.com/office/2006/metadata/properties" ma:root="true" ma:fieldsID="a936d9baba76aa3866493feff160faab" ns2:_="" ns3:_="">
     <xsd:import namespace="71af3243-3dd4-4a8d-8c0d-dd76da1f02a5"/>
@@ -14502,25 +14672,25 @@
 </ct:contentTypeSchema>
 </file>
 
-<file path=customXml/itemProps1.xml><?xml version="1.0" encoding="utf-8"?>
-<ds:datastoreItem xmlns:ds="http://schemas.openxmlformats.org/officeDocument/2006/customXml" ds:itemID="{137651BA-F45C-4845-9AB3-E0A65B39F5E1}">
-  <ds:schemaRefs>
-    <ds:schemaRef ds:uri="http://schemas.microsoft.com/office/2006/metadata/properties"/>
-    <ds:schemaRef ds:uri="http://schemas.microsoft.com/office/infopath/2007/PartnerControls"/>
-    <ds:schemaRef ds:uri="71af3243-3dd4-4a8d-8c0d-dd76da1f02a5"/>
-  </ds:schemaRefs>
-</ds:datastoreItem>
+<file path=customXml/item2.xml><?xml version="1.0" encoding="utf-8"?>
+<?mso-contentType ?>
+<FormTemplates xmlns="http://schemas.microsoft.com/sharepoint/v3/contenttype/forms">
+  <Display>DocumentLibraryForm</Display>
+  <Edit>DocumentLibraryForm</Edit>
+  <New>DocumentLibraryForm</New>
+</FormTemplates>
 </file>
 
-<file path=customXml/itemProps2.xml><?xml version="1.0" encoding="utf-8"?>
-<ds:datastoreItem xmlns:ds="http://schemas.openxmlformats.org/officeDocument/2006/customXml" ds:itemID="{CDB58277-F8DF-46FF-84EC-EF41B835E69F}">
-  <ds:schemaRefs>
-    <ds:schemaRef ds:uri="http://schemas.microsoft.com/sharepoint/v3/contenttype/forms"/>
-  </ds:schemaRefs>
-</ds:datastoreItem>
+<file path=customXml/item3.xml><?xml version="1.0" encoding="utf-8"?>
+<p:properties xmlns:p="http://schemas.microsoft.com/office/2006/metadata/properties" xmlns:xsi="http://www.w3.org/2001/XMLSchema-instance" xmlns:pc="http://schemas.microsoft.com/office/infopath/2007/PartnerControls">
+  <documentManagement>
+    <Status xmlns="71af3243-3dd4-4a8d-8c0d-dd76da1f02a5">Not started</Status>
+    <MediaServiceKeyPoints xmlns="71af3243-3dd4-4a8d-8c0d-dd76da1f02a5" xsi:nil="true"/>
+  </documentManagement>
+</p:properties>
 </file>
 
-<file path=customXml/itemProps3.xml><?xml version="1.0" encoding="utf-8"?>
+<file path=customXml/itemProps1.xml><?xml version="1.0" encoding="utf-8"?>
 <ds:datastoreItem xmlns:ds="http://schemas.openxmlformats.org/officeDocument/2006/customXml" ds:itemID="{2D276E62-80A3-44DD-9BCC-97ED2B99B57F}">
   <ds:schemaRefs>
     <ds:schemaRef ds:uri="http://schemas.microsoft.com/office/2006/metadata/contentType"/>
@@ -14537,4 +14707,22 @@
     <ds:schemaRef ds:uri="http://schemas.microsoft.com/internal/obd"/>
   </ds:schemaRefs>
 </ds:datastoreItem>
+</file>
+
+<file path=customXml/itemProps2.xml><?xml version="1.0" encoding="utf-8"?>
+<ds:datastoreItem xmlns:ds="http://schemas.openxmlformats.org/officeDocument/2006/customXml" ds:itemID="{CDB58277-F8DF-46FF-84EC-EF41B835E69F}">
+  <ds:schemaRefs>
+    <ds:schemaRef ds:uri="http://schemas.microsoft.com/sharepoint/v3/contenttype/forms"/>
+  </ds:schemaRefs>
+</ds:datastoreItem>
+</file>
+
+<file path=customXml/itemProps3.xml><?xml version="1.0" encoding="utf-8"?>
+<ds:datastoreItem xmlns:ds="http://schemas.openxmlformats.org/officeDocument/2006/customXml" ds:itemID="{137651BA-F45C-4845-9AB3-E0A65B39F5E1}">
+  <ds:schemaRefs>
+    <ds:schemaRef ds:uri="http://schemas.microsoft.com/office/2006/metadata/properties"/>
+    <ds:schemaRef ds:uri="http://schemas.microsoft.com/office/infopath/2007/PartnerControls"/>
+    <ds:schemaRef ds:uri="71af3243-3dd4-4a8d-8c0d-dd76da1f02a5"/>
+  </ds:schemaRefs>
+</ds:datastoreItem>
 </file>
</xml_diff>

<commit_message>
updated some prez formatting
</commit_message>
<xml_diff>
--- a/presentation/Auction Block.pptx
+++ b/presentation/Auction Block.pptx
@@ -14287,13 +14287,13 @@
             <p:ph idx="1"/>
             <p:extLst>
               <p:ext uri="{D42A27DB-BD31-4B8C-83A1-F6EECF244321}">
-                <p14:modId xmlns:p14="http://schemas.microsoft.com/office/powerpoint/2010/main" val="1523159196"/>
+                <p14:modId xmlns:p14="http://schemas.microsoft.com/office/powerpoint/2010/main" val="2808900647"/>
               </p:ext>
             </p:extLst>
           </p:nvPr>
         </p:nvGraphicFramePr>
         <p:xfrm>
-          <a:off x="5209082" y="2014194"/>
+          <a:off x="5483901" y="2209285"/>
           <a:ext cx="5916118" cy="3777521"/>
         </p:xfrm>
         <a:graphic>
@@ -14753,24 +14753,6 @@
 </file>
 
 <file path=customXml/item1.xml><?xml version="1.0" encoding="utf-8"?>
-<p:properties xmlns:p="http://schemas.microsoft.com/office/2006/metadata/properties" xmlns:xsi="http://www.w3.org/2001/XMLSchema-instance" xmlns:pc="http://schemas.microsoft.com/office/infopath/2007/PartnerControls">
-  <documentManagement>
-    <Status xmlns="71af3243-3dd4-4a8d-8c0d-dd76da1f02a5">Not started</Status>
-    <MediaServiceKeyPoints xmlns="71af3243-3dd4-4a8d-8c0d-dd76da1f02a5" xsi:nil="true"/>
-  </documentManagement>
-</p:properties>
-</file>
-
-<file path=customXml/item2.xml><?xml version="1.0" encoding="utf-8"?>
-<?mso-contentType ?>
-<FormTemplates xmlns="http://schemas.microsoft.com/sharepoint/v3/contenttype/forms">
-  <Display>DocumentLibraryForm</Display>
-  <Edit>DocumentLibraryForm</Edit>
-  <New>DocumentLibraryForm</New>
-</FormTemplates>
-</file>
-
-<file path=customXml/item3.xml><?xml version="1.0" encoding="utf-8"?>
 <ct:contentTypeSchema xmlns:ct="http://schemas.microsoft.com/office/2006/metadata/contentType" xmlns:ma="http://schemas.microsoft.com/office/2006/metadata/properties/metaAttributes" ct:_="" ma:_="" ma:contentTypeName="Document" ma:contentTypeID="0x01010079F111ED35F8CC479449609E8A0923A6" ma:contentTypeVersion="12" ma:contentTypeDescription="Create a new document." ma:contentTypeScope="" ma:versionID="a410dd7f93c95333ffa1b60ed6adedd1">
   <xsd:schema xmlns:xsd="http://www.w3.org/2001/XMLSchema" xmlns:xs="http://www.w3.org/2001/XMLSchema" xmlns:p="http://schemas.microsoft.com/office/2006/metadata/properties" xmlns:ns2="71af3243-3dd4-4a8d-8c0d-dd76da1f02a5" xmlns:ns3="16c05727-aa75-4e4a-9b5f-8a80a1165891" targetNamespace="http://schemas.microsoft.com/office/2006/metadata/properties" ma:root="true" ma:fieldsID="a936d9baba76aa3866493feff160faab" ns2:_="" ns3:_="">
     <xsd:import namespace="71af3243-3dd4-4a8d-8c0d-dd76da1f02a5"/>
@@ -14991,25 +14973,25 @@
 </ct:contentTypeSchema>
 </file>
 
-<file path=customXml/itemProps1.xml><?xml version="1.0" encoding="utf-8"?>
-<ds:datastoreItem xmlns:ds="http://schemas.openxmlformats.org/officeDocument/2006/customXml" ds:itemID="{137651BA-F45C-4845-9AB3-E0A65B39F5E1}">
-  <ds:schemaRefs>
-    <ds:schemaRef ds:uri="http://schemas.microsoft.com/office/2006/metadata/properties"/>
-    <ds:schemaRef ds:uri="http://schemas.microsoft.com/office/infopath/2007/PartnerControls"/>
-    <ds:schemaRef ds:uri="71af3243-3dd4-4a8d-8c0d-dd76da1f02a5"/>
-  </ds:schemaRefs>
-</ds:datastoreItem>
+<file path=customXml/item2.xml><?xml version="1.0" encoding="utf-8"?>
+<?mso-contentType ?>
+<FormTemplates xmlns="http://schemas.microsoft.com/sharepoint/v3/contenttype/forms">
+  <Display>DocumentLibraryForm</Display>
+  <Edit>DocumentLibraryForm</Edit>
+  <New>DocumentLibraryForm</New>
+</FormTemplates>
 </file>
 
-<file path=customXml/itemProps2.xml><?xml version="1.0" encoding="utf-8"?>
-<ds:datastoreItem xmlns:ds="http://schemas.openxmlformats.org/officeDocument/2006/customXml" ds:itemID="{CDB58277-F8DF-46FF-84EC-EF41B835E69F}">
-  <ds:schemaRefs>
-    <ds:schemaRef ds:uri="http://schemas.microsoft.com/sharepoint/v3/contenttype/forms"/>
-  </ds:schemaRefs>
-</ds:datastoreItem>
+<file path=customXml/item3.xml><?xml version="1.0" encoding="utf-8"?>
+<p:properties xmlns:p="http://schemas.microsoft.com/office/2006/metadata/properties" xmlns:xsi="http://www.w3.org/2001/XMLSchema-instance" xmlns:pc="http://schemas.microsoft.com/office/infopath/2007/PartnerControls">
+  <documentManagement>
+    <Status xmlns="71af3243-3dd4-4a8d-8c0d-dd76da1f02a5">Not started</Status>
+    <MediaServiceKeyPoints xmlns="71af3243-3dd4-4a8d-8c0d-dd76da1f02a5" xsi:nil="true"/>
+  </documentManagement>
+</p:properties>
 </file>
 
-<file path=customXml/itemProps3.xml><?xml version="1.0" encoding="utf-8"?>
+<file path=customXml/itemProps1.xml><?xml version="1.0" encoding="utf-8"?>
 <ds:datastoreItem xmlns:ds="http://schemas.openxmlformats.org/officeDocument/2006/customXml" ds:itemID="{2D276E62-80A3-44DD-9BCC-97ED2B99B57F}">
   <ds:schemaRefs>
     <ds:schemaRef ds:uri="http://schemas.microsoft.com/office/2006/metadata/contentType"/>
@@ -15026,4 +15008,22 @@
     <ds:schemaRef ds:uri="http://schemas.microsoft.com/internal/obd"/>
   </ds:schemaRefs>
 </ds:datastoreItem>
+</file>
+
+<file path=customXml/itemProps2.xml><?xml version="1.0" encoding="utf-8"?>
+<ds:datastoreItem xmlns:ds="http://schemas.openxmlformats.org/officeDocument/2006/customXml" ds:itemID="{CDB58277-F8DF-46FF-84EC-EF41B835E69F}">
+  <ds:schemaRefs>
+    <ds:schemaRef ds:uri="http://schemas.microsoft.com/sharepoint/v3/contenttype/forms"/>
+  </ds:schemaRefs>
+</ds:datastoreItem>
+</file>
+
+<file path=customXml/itemProps3.xml><?xml version="1.0" encoding="utf-8"?>
+<ds:datastoreItem xmlns:ds="http://schemas.openxmlformats.org/officeDocument/2006/customXml" ds:itemID="{137651BA-F45C-4845-9AB3-E0A65B39F5E1}">
+  <ds:schemaRefs>
+    <ds:schemaRef ds:uri="http://schemas.microsoft.com/office/2006/metadata/properties"/>
+    <ds:schemaRef ds:uri="http://schemas.microsoft.com/office/infopath/2007/PartnerControls"/>
+    <ds:schemaRef ds:uri="71af3243-3dd4-4a8d-8c0d-dd76da1f02a5"/>
+  </ds:schemaRefs>
+</ds:datastoreItem>
 </file>
</xml_diff>